<commit_message>
updated the robot aspects and where to draw the line slides
</commit_message>
<xml_diff>
--- a/Research Presntation.pptx
+++ b/Research Presntation.pptx
@@ -289,7 +289,7 @@
           <a:p>
             <a:fld id="{70C62A42-C283-41B3-99EF-D3E8EE93DF1C}" type="datetimeFigureOut">
               <a:rPr lang="en-US" smtClean="0"/>
-              <a:t>5/17/2022</a:t>
+              <a:t>5/25/2022</a:t>
             </a:fld>
             <a:endParaRPr lang="en-US"/>
           </a:p>
@@ -556,7 +556,7 @@
           <a:p>
             <a:fld id="{70C62A42-C283-41B3-99EF-D3E8EE93DF1C}" type="datetimeFigureOut">
               <a:rPr lang="en-US" smtClean="0"/>
-              <a:t>5/17/2022</a:t>
+              <a:t>5/25/2022</a:t>
             </a:fld>
             <a:endParaRPr lang="en-US"/>
           </a:p>
@@ -787,7 +787,7 @@
           <a:p>
             <a:fld id="{70C62A42-C283-41B3-99EF-D3E8EE93DF1C}" type="datetimeFigureOut">
               <a:rPr lang="en-US" smtClean="0"/>
-              <a:t>5/17/2022</a:t>
+              <a:t>5/25/2022</a:t>
             </a:fld>
             <a:endParaRPr lang="en-US"/>
           </a:p>
@@ -1097,7 +1097,7 @@
           <a:p>
             <a:fld id="{70C62A42-C283-41B3-99EF-D3E8EE93DF1C}" type="datetimeFigureOut">
               <a:rPr lang="en-US" smtClean="0"/>
-              <a:t>5/17/2022</a:t>
+              <a:t>5/25/2022</a:t>
             </a:fld>
             <a:endParaRPr lang="en-US"/>
           </a:p>
@@ -1570,7 +1570,7 @@
           <a:p>
             <a:fld id="{70C62A42-C283-41B3-99EF-D3E8EE93DF1C}" type="datetimeFigureOut">
               <a:rPr lang="en-US" smtClean="0"/>
-              <a:t>5/17/2022</a:t>
+              <a:t>5/25/2022</a:t>
             </a:fld>
             <a:endParaRPr lang="en-US"/>
           </a:p>
@@ -2117,7 +2117,7 @@
           <a:p>
             <a:fld id="{70C62A42-C283-41B3-99EF-D3E8EE93DF1C}" type="datetimeFigureOut">
               <a:rPr lang="en-US" smtClean="0"/>
-              <a:t>5/17/2022</a:t>
+              <a:t>5/25/2022</a:t>
             </a:fld>
             <a:endParaRPr lang="en-US"/>
           </a:p>
@@ -2891,7 +2891,7 @@
           <a:p>
             <a:fld id="{70C62A42-C283-41B3-99EF-D3E8EE93DF1C}" type="datetimeFigureOut">
               <a:rPr lang="en-US" smtClean="0"/>
-              <a:t>5/17/2022</a:t>
+              <a:t>5/25/2022</a:t>
             </a:fld>
             <a:endParaRPr lang="en-US"/>
           </a:p>
@@ -3066,7 +3066,7 @@
           <a:p>
             <a:fld id="{70C62A42-C283-41B3-99EF-D3E8EE93DF1C}" type="datetimeFigureOut">
               <a:rPr lang="en-US" smtClean="0"/>
-              <a:t>5/17/2022</a:t>
+              <a:t>5/25/2022</a:t>
             </a:fld>
             <a:endParaRPr lang="en-US"/>
           </a:p>
@@ -3289,7 +3289,7 @@
           <a:p>
             <a:fld id="{70C62A42-C283-41B3-99EF-D3E8EE93DF1C}" type="datetimeFigureOut">
               <a:rPr lang="en-US" smtClean="0"/>
-              <a:t>5/17/2022</a:t>
+              <a:t>5/25/2022</a:t>
             </a:fld>
             <a:endParaRPr lang="en-US"/>
           </a:p>
@@ -3469,7 +3469,7 @@
           <a:p>
             <a:fld id="{70C62A42-C283-41B3-99EF-D3E8EE93DF1C}" type="datetimeFigureOut">
               <a:rPr lang="en-US" smtClean="0"/>
-              <a:t>5/17/2022</a:t>
+              <a:t>5/25/2022</a:t>
             </a:fld>
             <a:endParaRPr lang="en-US"/>
           </a:p>
@@ -3758,7 +3758,7 @@
           <a:p>
             <a:fld id="{70C62A42-C283-41B3-99EF-D3E8EE93DF1C}" type="datetimeFigureOut">
               <a:rPr lang="en-US" smtClean="0"/>
-              <a:t>5/17/2022</a:t>
+              <a:t>5/25/2022</a:t>
             </a:fld>
             <a:endParaRPr lang="en-US"/>
           </a:p>
@@ -4000,7 +4000,7 @@
           <a:p>
             <a:fld id="{70C62A42-C283-41B3-99EF-D3E8EE93DF1C}" type="datetimeFigureOut">
               <a:rPr lang="en-US" smtClean="0"/>
-              <a:t>5/17/2022</a:t>
+              <a:t>5/25/2022</a:t>
             </a:fld>
             <a:endParaRPr lang="en-US"/>
           </a:p>
@@ -4379,7 +4379,7 @@
           <a:p>
             <a:fld id="{70C62A42-C283-41B3-99EF-D3E8EE93DF1C}" type="datetimeFigureOut">
               <a:rPr lang="en-US" smtClean="0"/>
-              <a:t>5/17/2022</a:t>
+              <a:t>5/25/2022</a:t>
             </a:fld>
             <a:endParaRPr lang="en-US"/>
           </a:p>
@@ -4497,7 +4497,7 @@
           <a:p>
             <a:fld id="{70C62A42-C283-41B3-99EF-D3E8EE93DF1C}" type="datetimeFigureOut">
               <a:rPr lang="en-US" smtClean="0"/>
-              <a:t>5/17/2022</a:t>
+              <a:t>5/25/2022</a:t>
             </a:fld>
             <a:endParaRPr lang="en-US"/>
           </a:p>
@@ -4592,7 +4592,7 @@
           <a:p>
             <a:fld id="{70C62A42-C283-41B3-99EF-D3E8EE93DF1C}" type="datetimeFigureOut">
               <a:rPr lang="en-US" smtClean="0"/>
-              <a:t>5/17/2022</a:t>
+              <a:t>5/25/2022</a:t>
             </a:fld>
             <a:endParaRPr lang="en-US"/>
           </a:p>
@@ -4841,7 +4841,7 @@
           <a:p>
             <a:fld id="{70C62A42-C283-41B3-99EF-D3E8EE93DF1C}" type="datetimeFigureOut">
               <a:rPr lang="en-US" smtClean="0"/>
-              <a:t>5/17/2022</a:t>
+              <a:t>5/25/2022</a:t>
             </a:fld>
             <a:endParaRPr lang="en-US"/>
           </a:p>
@@ -5098,7 +5098,7 @@
           <a:p>
             <a:fld id="{70C62A42-C283-41B3-99EF-D3E8EE93DF1C}" type="datetimeFigureOut">
               <a:rPr lang="en-US" smtClean="0"/>
-              <a:t>5/17/2022</a:t>
+              <a:t>5/25/2022</a:t>
             </a:fld>
             <a:endParaRPr lang="en-US"/>
           </a:p>
@@ -5341,7 +5341,7 @@
           <a:p>
             <a:fld id="{70C62A42-C283-41B3-99EF-D3E8EE93DF1C}" type="datetimeFigureOut">
               <a:rPr lang="en-US" smtClean="0"/>
-              <a:t>5/17/2022</a:t>
+              <a:t>5/25/2022</a:t>
             </a:fld>
             <a:endParaRPr lang="en-US"/>
           </a:p>
@@ -6114,7 +6114,12 @@
             <p:ph idx="1"/>
           </p:nvPr>
         </p:nvSpPr>
-        <p:spPr/>
+        <p:spPr>
+          <a:xfrm>
+            <a:off x="685800" y="2204720"/>
+            <a:ext cx="10820400" cy="4024125"/>
+          </a:xfrm>
+        </p:spPr>
         <p:txBody>
           <a:bodyPr/>
           <a:lstStyle/>
@@ -6210,13 +6215,13 @@
   <p:clrMapOvr>
     <a:masterClrMapping/>
   </p:clrMapOvr>
-  <mc:AlternateContent xmlns:mc="http://schemas.openxmlformats.org/markup-compatibility/2006">
-    <mc:Choice xmlns:p159="http://schemas.microsoft.com/office/powerpoint/2015/09/main" Requires="p159">
+  <mc:AlternateContent xmlns:mc="http://schemas.openxmlformats.org/markup-compatibility/2006" xmlns:p159="http://schemas.microsoft.com/office/powerpoint/2015/09/main">
+    <mc:Choice Requires="p159">
       <p:transition xmlns:p14="http://schemas.microsoft.com/office/powerpoint/2010/main" spd="slow" p14:dur="2000">
         <p159:morph option="byObject"/>
       </p:transition>
     </mc:Choice>
-    <mc:Fallback>
+    <mc:Fallback xmlns="">
       <p:transition spd="slow">
         <p:fade/>
       </p:transition>
@@ -6878,13 +6883,13 @@
   <p:clrMapOvr>
     <a:masterClrMapping/>
   </p:clrMapOvr>
-  <mc:AlternateContent xmlns:mc="http://schemas.openxmlformats.org/markup-compatibility/2006">
-    <mc:Choice xmlns:p159="http://schemas.microsoft.com/office/powerpoint/2015/09/main" Requires="p159">
+  <mc:AlternateContent xmlns:mc="http://schemas.openxmlformats.org/markup-compatibility/2006" xmlns:p159="http://schemas.microsoft.com/office/powerpoint/2015/09/main">
+    <mc:Choice Requires="p159">
       <p:transition xmlns:p14="http://schemas.microsoft.com/office/powerpoint/2010/main" spd="slow" p14:dur="2000">
         <p159:morph option="byObject"/>
       </p:transition>
     </mc:Choice>
-    <mc:Fallback>
+    <mc:Fallback xmlns="">
       <p:transition spd="slow">
         <p:fade/>
       </p:transition>
@@ -7718,6 +7723,23 @@
               </a:rPr>
               <a:t>Autonomous </a:t>
             </a:r>
+          </a:p>
+          <a:p>
+            <a:endParaRPr lang="en-US" sz="1800" b="1" dirty="0">
+              <a:latin typeface="Times New Roman" panose="02020603050405020304" pitchFamily="18" charset="0"/>
+              <a:ea typeface="Calibri" panose="020F0502020204030204" pitchFamily="34" charset="0"/>
+              <a:cs typeface="Arial" panose="020B0604020202020204" pitchFamily="34" charset="0"/>
+            </a:endParaRPr>
+          </a:p>
+          <a:p>
+            <a:r>
+              <a:rPr lang="en-US" sz="1800" b="1" dirty="0">
+                <a:latin typeface="Times New Roman" panose="02020603050405020304" pitchFamily="18" charset="0"/>
+                <a:ea typeface="Calibri" panose="020F0502020204030204" pitchFamily="34" charset="0"/>
+                <a:cs typeface="Arial" panose="020B0604020202020204" pitchFamily="34" charset="0"/>
+              </a:rPr>
+              <a:t>Range of sizes and intelligence </a:t>
+            </a:r>
             <a:endParaRPr lang="en-US" sz="1800" dirty="0">
               <a:effectLst/>
               <a:latin typeface="Calibri" panose="020F0502020204030204" pitchFamily="34" charset="0"/>
@@ -7744,13 +7766,13 @@
   <p:clrMapOvr>
     <a:masterClrMapping/>
   </p:clrMapOvr>
-  <mc:AlternateContent xmlns:mc="http://schemas.openxmlformats.org/markup-compatibility/2006">
-    <mc:Choice xmlns:p159="http://schemas.microsoft.com/office/powerpoint/2015/09/main" Requires="p159">
+  <mc:AlternateContent xmlns:mc="http://schemas.openxmlformats.org/markup-compatibility/2006" xmlns:p159="http://schemas.microsoft.com/office/powerpoint/2015/09/main">
+    <mc:Choice Requires="p159">
       <p:transition xmlns:p14="http://schemas.microsoft.com/office/powerpoint/2010/main" spd="slow" p14:dur="2000">
         <p159:morph option="byObject"/>
       </p:transition>
     </mc:Choice>
-    <mc:Fallback>
+    <mc:Fallback xmlns="">
       <p:transition spd="slow">
         <p:fade/>
       </p:transition>
@@ -8194,6 +8216,121 @@
                                           <p:spTgt spid="3">
                                             <p:txEl>
                                               <p:pRg st="4" end="4"/>
+                                            </p:txEl>
+                                          </p:spTgt>
+                                        </p:tgtEl>
+                                      </p:cBhvr>
+                                    </p:animEffect>
+                                  </p:childTnLst>
+                                </p:cTn>
+                              </p:par>
+                            </p:childTnLst>
+                          </p:cTn>
+                        </p:par>
+                      </p:childTnLst>
+                    </p:cTn>
+                  </p:par>
+                  <p:par>
+                    <p:cTn id="31" fill="hold">
+                      <p:stCondLst>
+                        <p:cond delay="indefinite"/>
+                      </p:stCondLst>
+                      <p:childTnLst>
+                        <p:par>
+                          <p:cTn id="32" fill="hold">
+                            <p:stCondLst>
+                              <p:cond delay="0"/>
+                            </p:stCondLst>
+                            <p:childTnLst>
+                              <p:par>
+                                <p:cTn id="33" presetID="53" presetClass="entr" presetSubtype="16" fill="hold" nodeType="clickEffect">
+                                  <p:stCondLst>
+                                    <p:cond delay="0"/>
+                                  </p:stCondLst>
+                                  <p:childTnLst>
+                                    <p:set>
+                                      <p:cBhvr>
+                                        <p:cTn id="34" dur="1" fill="hold">
+                                          <p:stCondLst>
+                                            <p:cond delay="0"/>
+                                          </p:stCondLst>
+                                        </p:cTn>
+                                        <p:tgtEl>
+                                          <p:spTgt spid="3">
+                                            <p:txEl>
+                                              <p:pRg st="6" end="6"/>
+                                            </p:txEl>
+                                          </p:spTgt>
+                                        </p:tgtEl>
+                                        <p:attrNameLst>
+                                          <p:attrName>style.visibility</p:attrName>
+                                        </p:attrNameLst>
+                                      </p:cBhvr>
+                                      <p:to>
+                                        <p:strVal val="visible"/>
+                                      </p:to>
+                                    </p:set>
+                                    <p:anim calcmode="lin" valueType="num">
+                                      <p:cBhvr>
+                                        <p:cTn id="35" dur="500" fill="hold"/>
+                                        <p:tgtEl>
+                                          <p:spTgt spid="3">
+                                            <p:txEl>
+                                              <p:pRg st="6" end="6"/>
+                                            </p:txEl>
+                                          </p:spTgt>
+                                        </p:tgtEl>
+                                        <p:attrNameLst>
+                                          <p:attrName>ppt_w</p:attrName>
+                                        </p:attrNameLst>
+                                      </p:cBhvr>
+                                      <p:tavLst>
+                                        <p:tav tm="0">
+                                          <p:val>
+                                            <p:fltVal val="0"/>
+                                          </p:val>
+                                        </p:tav>
+                                        <p:tav tm="100000">
+                                          <p:val>
+                                            <p:strVal val="#ppt_w"/>
+                                          </p:val>
+                                        </p:tav>
+                                      </p:tavLst>
+                                    </p:anim>
+                                    <p:anim calcmode="lin" valueType="num">
+                                      <p:cBhvr>
+                                        <p:cTn id="36" dur="500" fill="hold"/>
+                                        <p:tgtEl>
+                                          <p:spTgt spid="3">
+                                            <p:txEl>
+                                              <p:pRg st="6" end="6"/>
+                                            </p:txEl>
+                                          </p:spTgt>
+                                        </p:tgtEl>
+                                        <p:attrNameLst>
+                                          <p:attrName>ppt_h</p:attrName>
+                                        </p:attrNameLst>
+                                      </p:cBhvr>
+                                      <p:tavLst>
+                                        <p:tav tm="0">
+                                          <p:val>
+                                            <p:fltVal val="0"/>
+                                          </p:val>
+                                        </p:tav>
+                                        <p:tav tm="100000">
+                                          <p:val>
+                                            <p:strVal val="#ppt_h"/>
+                                          </p:val>
+                                        </p:tav>
+                                      </p:tavLst>
+                                    </p:anim>
+                                    <p:animEffect transition="in" filter="fade">
+                                      <p:cBhvr>
+                                        <p:cTn id="37" dur="500"/>
+                                        <p:tgtEl>
+                                          <p:spTgt spid="3">
+                                            <p:txEl>
+                                              <p:pRg st="6" end="6"/>
                                             </p:txEl>
                                           </p:spTgt>
                                         </p:tgtEl>
@@ -8315,19 +8452,12 @@
             </a:pPr>
             <a:r>
               <a:rPr lang="en-US" sz="1800" dirty="0">
-                <a:effectLst/>
                 <a:latin typeface="Times New Roman" panose="02020603050405020304" pitchFamily="18" charset="0"/>
                 <a:ea typeface="Calibri" panose="020F0502020204030204" pitchFamily="34" charset="0"/>
                 <a:cs typeface="Arial" panose="020B0604020202020204" pitchFamily="34" charset="0"/>
               </a:rPr>
-              <a:t>For ages human do their job where they do a demanding work but sometimes, they do not produce the amount that cover the price because the workers get tired after long work until robots where created which replaced the human work force in many industries as robots don’t  get tired so they can work all day.</a:t>
-            </a:r>
-            <a:endParaRPr lang="en-US" sz="1800" dirty="0">
-              <a:effectLst/>
-              <a:latin typeface="Calibri" panose="020F0502020204030204" pitchFamily="34" charset="0"/>
-              <a:ea typeface="Calibri" panose="020F0502020204030204" pitchFamily="34" charset="0"/>
-              <a:cs typeface="Arial" panose="020B0604020202020204" pitchFamily="34" charset="0"/>
-            </a:endParaRPr>
+              <a:t>Now we know the biggest aspects of humans and robots where do we draw the line ?</a:t>
+            </a:r>
           </a:p>
           <a:p>
             <a:pPr marL="0" marR="0" indent="457200">
@@ -8343,12 +8473,11 @@
             </a:pPr>
             <a:r>
               <a:rPr lang="en-US" sz="1800" dirty="0">
-                <a:effectLst/>
                 <a:latin typeface="Times New Roman" panose="02020603050405020304" pitchFamily="18" charset="0"/>
                 <a:ea typeface="Calibri" panose="020F0502020204030204" pitchFamily="34" charset="0"/>
                 <a:cs typeface="Arial" panose="020B0604020202020204" pitchFamily="34" charset="0"/>
               </a:rPr>
-              <a:t>Because of that some jobs replace human workers with robot’s worker, and it is risen the benefit of the result, but the robot cannot do everything there is some job that robot can take part of it but can't replace the humans.</a:t>
+              <a:t>We draw the line at the extremes where the job must be fully human or fully robotic </a:t>
             </a:r>
           </a:p>
           <a:p>
@@ -8363,24 +8492,6 @@
                 <a:spcPts val="800"/>
               </a:spcAft>
             </a:pPr>
-            <a:endParaRPr lang="en-US" sz="1800" dirty="0">
-              <a:latin typeface="Times New Roman" panose="02020603050405020304" pitchFamily="18" charset="0"/>
-              <a:ea typeface="Calibri" panose="020F0502020204030204" pitchFamily="34" charset="0"/>
-              <a:cs typeface="Arial" panose="020B0604020202020204" pitchFamily="34" charset="0"/>
-            </a:endParaRPr>
-          </a:p>
-          <a:p>
-            <a:pPr marL="0" marR="0" indent="457200">
-              <a:lnSpc>
-                <a:spcPct val="107000"/>
-              </a:lnSpc>
-              <a:spcBef>
-                <a:spcPts val="0"/>
-              </a:spcBef>
-              <a:spcAft>
-                <a:spcPts val="800"/>
-              </a:spcAft>
-            </a:pPr>
             <a:r>
               <a:rPr lang="en-US" sz="1800" dirty="0">
                 <a:effectLst/>
@@ -8388,7 +8499,7 @@
                 <a:ea typeface="Calibri" panose="020F0502020204030204" pitchFamily="34" charset="0"/>
                 <a:cs typeface="Arial" panose="020B0604020202020204" pitchFamily="34" charset="0"/>
               </a:rPr>
-              <a:t>However, that doesn’t mean we have to replace all humans in all fields as we pointed out before the aspects  that humans have are nonnegotiably in need of human employees for example :</a:t>
+              <a:t>For example, at the human's side :</a:t>
             </a:r>
             <a:endParaRPr lang="en-US" sz="1800" dirty="0">
               <a:effectLst/>
@@ -8398,8 +8509,9 @@
             </a:endParaRPr>
           </a:p>
           <a:p>
-            <a:r>
-              <a:rPr lang="en-US" sz="1800" b="1" dirty="0">
+            <a:pPr lvl="1"/>
+            <a:r>
+              <a:rPr lang="en-US" sz="1600" b="1" dirty="0">
                 <a:effectLst/>
                 <a:latin typeface="Times New Roman" panose="02020603050405020304" pitchFamily="18" charset="0"/>
                 <a:ea typeface="Times New Roman" panose="02020603050405020304" pitchFamily="18" charset="0"/>
@@ -8407,15 +8519,16 @@
               </a:rPr>
               <a:t>Childcare Expert</a:t>
             </a:r>
-            <a:endParaRPr lang="en-US" sz="1800" b="1" dirty="0">
+            <a:endParaRPr lang="en-US" sz="1600" b="1" dirty="0">
               <a:effectLst/>
               <a:latin typeface="Times New Roman" panose="02020603050405020304" pitchFamily="18" charset="0"/>
               <a:ea typeface="Times New Roman" panose="02020603050405020304" pitchFamily="18" charset="0"/>
             </a:endParaRPr>
           </a:p>
           <a:p>
-            <a:r>
-              <a:rPr lang="en-US" sz="1800" b="1" dirty="0">
+            <a:pPr lvl="1"/>
+            <a:r>
+              <a:rPr lang="en-US" sz="1600" b="1" dirty="0">
                 <a:effectLst/>
                 <a:latin typeface="Times New Roman" panose="02020603050405020304" pitchFamily="18" charset="0"/>
                 <a:ea typeface="Times New Roman" panose="02020603050405020304" pitchFamily="18" charset="0"/>
@@ -8423,15 +8536,16 @@
               </a:rPr>
               <a:t>Teacher</a:t>
             </a:r>
-            <a:endParaRPr lang="en-US" sz="1800" b="1" dirty="0">
+            <a:endParaRPr lang="en-US" sz="1600" b="1" dirty="0">
               <a:effectLst/>
               <a:latin typeface="Times New Roman" panose="02020603050405020304" pitchFamily="18" charset="0"/>
               <a:ea typeface="Times New Roman" panose="02020603050405020304" pitchFamily="18" charset="0"/>
             </a:endParaRPr>
           </a:p>
           <a:p>
-            <a:r>
-              <a:rPr lang="en-US" sz="1800" b="1" dirty="0">
+            <a:pPr lvl="1"/>
+            <a:r>
+              <a:rPr lang="en-US" sz="1600" b="1" dirty="0">
                 <a:effectLst/>
                 <a:latin typeface="Times New Roman" panose="02020603050405020304" pitchFamily="18" charset="0"/>
                 <a:ea typeface="Times New Roman" panose="02020603050405020304" pitchFamily="18" charset="0"/>
@@ -8439,14 +8553,57 @@
               </a:rPr>
               <a:t>Doctor</a:t>
             </a:r>
-            <a:endParaRPr lang="en-US" sz="1800" b="1" dirty="0">
-              <a:effectLst/>
-              <a:latin typeface="Times New Roman" panose="02020603050405020304" pitchFamily="18" charset="0"/>
-              <a:ea typeface="Times New Roman" panose="02020603050405020304" pitchFamily="18" charset="0"/>
-            </a:endParaRPr>
-          </a:p>
-          <a:p>
+          </a:p>
+          <a:p>
+            <a:pPr lvl="1"/>
+            <a:r>
+              <a:rPr lang="en-US" sz="1600" b="1" dirty="0">
+                <a:latin typeface="Times New Roman" panose="02020603050405020304" pitchFamily="18" charset="0"/>
+                <a:ea typeface="Times New Roman" panose="02020603050405020304" pitchFamily="18" charset="0"/>
+                <a:cs typeface="Times New Roman" panose="02020603050405020304" pitchFamily="18" charset="0"/>
+              </a:rPr>
+              <a:t>Basically, anything that is in a fast-changing environment or needs emotional intelligence </a:t>
+            </a:r>
             <a:endParaRPr lang="en-US" dirty="0"/>
+          </a:p>
+          <a:p>
+            <a:r>
+              <a:rPr lang="en-US" sz="1800" dirty="0">
+                <a:latin typeface="Times New Roman" panose="02020603050405020304" pitchFamily="18" charset="0"/>
+                <a:cs typeface="Times New Roman" panose="02020603050405020304" pitchFamily="18" charset="0"/>
+              </a:rPr>
+              <a:t> for the robot's side :</a:t>
+            </a:r>
+          </a:p>
+          <a:p>
+            <a:pPr lvl="1"/>
+            <a:r>
+              <a:rPr lang="en-US" sz="1600" b="1" dirty="0">
+                <a:latin typeface="Times New Roman" panose="02020603050405020304" pitchFamily="18" charset="0"/>
+                <a:cs typeface="Times New Roman" panose="02020603050405020304" pitchFamily="18" charset="0"/>
+              </a:rPr>
+              <a:t>Cargo transport </a:t>
+            </a:r>
+          </a:p>
+          <a:p>
+            <a:pPr lvl="1"/>
+            <a:r>
+              <a:rPr lang="en-US" sz="1600" b="1" dirty="0">
+                <a:latin typeface="Times New Roman" panose="02020603050405020304" pitchFamily="18" charset="0"/>
+                <a:cs typeface="Times New Roman" panose="02020603050405020304" pitchFamily="18" charset="0"/>
+              </a:rPr>
+              <a:t>Jobs at dangers sides such as volcanoes and space</a:t>
+            </a:r>
+          </a:p>
+          <a:p>
+            <a:pPr lvl="1"/>
+            <a:r>
+              <a:rPr lang="en-US" sz="1600" b="1" dirty="0">
+                <a:latin typeface="Times New Roman" panose="02020603050405020304" pitchFamily="18" charset="0"/>
+                <a:cs typeface="Times New Roman" panose="02020603050405020304" pitchFamily="18" charset="0"/>
+              </a:rPr>
+              <a:t>Basically, anything where human life is at  risk or above human strengths are needed </a:t>
+            </a:r>
           </a:p>
         </p:txBody>
       </p:sp>
@@ -8460,13 +8617,13 @@
   <p:clrMapOvr>
     <a:masterClrMapping/>
   </p:clrMapOvr>
-  <mc:AlternateContent xmlns:mc="http://schemas.openxmlformats.org/markup-compatibility/2006">
-    <mc:Choice xmlns:p159="http://schemas.microsoft.com/office/powerpoint/2015/09/main" Requires="p159">
+  <mc:AlternateContent xmlns:mc="http://schemas.openxmlformats.org/markup-compatibility/2006" xmlns:p159="http://schemas.microsoft.com/office/powerpoint/2015/09/main">
+    <mc:Choice Requires="p159">
       <p:transition xmlns:p14="http://schemas.microsoft.com/office/powerpoint/2010/main" spd="slow" p14:dur="2000">
         <p159:morph option="byObject"/>
       </p:transition>
     </mc:Choice>
-    <mc:Fallback>
+    <mc:Fallback xmlns="">
       <p:transition spd="slow">
         <p:fade/>
       </p:transition>
@@ -8837,7 +8994,7 @@
                                         <p:tgtEl>
                                           <p:spTgt spid="3">
                                             <p:txEl>
-                                              <p:pRg st="3" end="3"/>
+                                              <p:pRg st="2" end="2"/>
                                             </p:txEl>
                                           </p:spTgt>
                                         </p:tgtEl>
@@ -8855,7 +9012,7 @@
                                         <p:tgtEl>
                                           <p:spTgt spid="3">
                                             <p:txEl>
-                                              <p:pRg st="3" end="3"/>
+                                              <p:pRg st="2" end="2"/>
                                             </p:txEl>
                                           </p:spTgt>
                                         </p:tgtEl>
@@ -8867,7 +9024,7 @@
                                         <p:tgtEl>
                                           <p:spTgt spid="3">
                                             <p:txEl>
-                                              <p:pRg st="3" end="3"/>
+                                              <p:pRg st="2" end="2"/>
                                             </p:txEl>
                                           </p:spTgt>
                                         </p:tgtEl>
@@ -8894,7 +9051,7 @@
                                         <p:tgtEl>
                                           <p:spTgt spid="3">
                                             <p:txEl>
-                                              <p:pRg st="3" end="3"/>
+                                              <p:pRg st="2" end="2"/>
                                             </p:txEl>
                                           </p:spTgt>
                                         </p:tgtEl>
@@ -8952,7 +9109,7 @@
                                         <p:tgtEl>
                                           <p:spTgt spid="3">
                                             <p:txEl>
-                                              <p:pRg st="4" end="4"/>
+                                              <p:pRg st="3" end="3"/>
                                             </p:txEl>
                                           </p:spTgt>
                                         </p:tgtEl>
@@ -8970,7 +9127,7 @@
                                         <p:tgtEl>
                                           <p:spTgt spid="3">
                                             <p:txEl>
-                                              <p:pRg st="4" end="4"/>
+                                              <p:pRg st="3" end="3"/>
                                             </p:txEl>
                                           </p:spTgt>
                                         </p:tgtEl>
@@ -8997,7 +9154,7 @@
                                         <p:tgtEl>
                                           <p:spTgt spid="3">
                                             <p:txEl>
-                                              <p:pRg st="4" end="4"/>
+                                              <p:pRg st="3" end="3"/>
                                             </p:txEl>
                                           </p:spTgt>
                                         </p:tgtEl>
@@ -9024,7 +9181,7 @@
                                         <p:tgtEl>
                                           <p:spTgt spid="3">
                                             <p:txEl>
-                                              <p:pRg st="4" end="4"/>
+                                              <p:pRg st="3" end="3"/>
                                             </p:txEl>
                                           </p:spTgt>
                                         </p:tgtEl>
@@ -9067,7 +9224,7 @@
                                         <p:tgtEl>
                                           <p:spTgt spid="3">
                                             <p:txEl>
-                                              <p:pRg st="5" end="5"/>
+                                              <p:pRg st="4" end="4"/>
                                             </p:txEl>
                                           </p:spTgt>
                                         </p:tgtEl>
@@ -9085,7 +9242,7 @@
                                         <p:tgtEl>
                                           <p:spTgt spid="3">
                                             <p:txEl>
-                                              <p:pRg st="5" end="5"/>
+                                              <p:pRg st="4" end="4"/>
                                             </p:txEl>
                                           </p:spTgt>
                                         </p:tgtEl>
@@ -9112,7 +9269,7 @@
                                         <p:tgtEl>
                                           <p:spTgt spid="3">
                                             <p:txEl>
-                                              <p:pRg st="5" end="5"/>
+                                              <p:pRg st="4" end="4"/>
                                             </p:txEl>
                                           </p:spTgt>
                                         </p:tgtEl>
@@ -9139,7 +9296,7 @@
                                         <p:tgtEl>
                                           <p:spTgt spid="3">
                                             <p:txEl>
-                                              <p:pRg st="5" end="5"/>
+                                              <p:pRg st="4" end="4"/>
                                             </p:txEl>
                                           </p:spTgt>
                                         </p:tgtEl>
@@ -9182,7 +9339,7 @@
                                         <p:tgtEl>
                                           <p:spTgt spid="3">
                                             <p:txEl>
-                                              <p:pRg st="6" end="6"/>
+                                              <p:pRg st="5" end="5"/>
                                             </p:txEl>
                                           </p:spTgt>
                                         </p:tgtEl>
@@ -9200,7 +9357,7 @@
                                         <p:tgtEl>
                                           <p:spTgt spid="3">
                                             <p:txEl>
-                                              <p:pRg st="6" end="6"/>
+                                              <p:pRg st="5" end="5"/>
                                             </p:txEl>
                                           </p:spTgt>
                                         </p:tgtEl>
@@ -9224,6 +9381,76 @@
                                     <p:anim calcmode="lin" valueType="num">
                                       <p:cBhvr>
                                         <p:cTn id="50" dur="500" fill="hold"/>
+                                        <p:tgtEl>
+                                          <p:spTgt spid="3">
+                                            <p:txEl>
+                                              <p:pRg st="5" end="5"/>
+                                            </p:txEl>
+                                          </p:spTgt>
+                                        </p:tgtEl>
+                                        <p:attrNameLst>
+                                          <p:attrName>ppt_h</p:attrName>
+                                        </p:attrNameLst>
+                                      </p:cBhvr>
+                                      <p:tavLst>
+                                        <p:tav tm="0">
+                                          <p:val>
+                                            <p:fltVal val="0"/>
+                                          </p:val>
+                                        </p:tav>
+                                        <p:tav tm="100000">
+                                          <p:val>
+                                            <p:strVal val="#ppt_h"/>
+                                          </p:val>
+                                        </p:tav>
+                                      </p:tavLst>
+                                    </p:anim>
+                                    <p:animEffect transition="in" filter="fade">
+                                      <p:cBhvr>
+                                        <p:cTn id="51" dur="500"/>
+                                        <p:tgtEl>
+                                          <p:spTgt spid="3">
+                                            <p:txEl>
+                                              <p:pRg st="5" end="5"/>
+                                            </p:txEl>
+                                          </p:spTgt>
+                                        </p:tgtEl>
+                                      </p:cBhvr>
+                                    </p:animEffect>
+                                  </p:childTnLst>
+                                </p:cTn>
+                              </p:par>
+                            </p:childTnLst>
+                          </p:cTn>
+                        </p:par>
+                      </p:childTnLst>
+                    </p:cTn>
+                  </p:par>
+                  <p:par>
+                    <p:cTn id="52" fill="hold">
+                      <p:stCondLst>
+                        <p:cond delay="indefinite"/>
+                      </p:stCondLst>
+                      <p:childTnLst>
+                        <p:par>
+                          <p:cTn id="53" fill="hold">
+                            <p:stCondLst>
+                              <p:cond delay="0"/>
+                            </p:stCondLst>
+                            <p:childTnLst>
+                              <p:par>
+                                <p:cTn id="54" presetID="53" presetClass="entr" presetSubtype="16" fill="hold" nodeType="clickEffect">
+                                  <p:stCondLst>
+                                    <p:cond delay="0"/>
+                                  </p:stCondLst>
+                                  <p:childTnLst>
+                                    <p:set>
+                                      <p:cBhvr>
+                                        <p:cTn id="55" dur="1" fill="hold">
+                                          <p:stCondLst>
+                                            <p:cond delay="0"/>
+                                          </p:stCondLst>
+                                        </p:cTn>
                                         <p:tgtEl>
                                           <p:spTgt spid="3">
                                             <p:txEl>
@@ -9232,6 +9459,51 @@
                                           </p:spTgt>
                                         </p:tgtEl>
                                         <p:attrNameLst>
+                                          <p:attrName>style.visibility</p:attrName>
+                                        </p:attrNameLst>
+                                      </p:cBhvr>
+                                      <p:to>
+                                        <p:strVal val="visible"/>
+                                      </p:to>
+                                    </p:set>
+                                    <p:anim calcmode="lin" valueType="num">
+                                      <p:cBhvr>
+                                        <p:cTn id="56" dur="500" fill="hold"/>
+                                        <p:tgtEl>
+                                          <p:spTgt spid="3">
+                                            <p:txEl>
+                                              <p:pRg st="6" end="6"/>
+                                            </p:txEl>
+                                          </p:spTgt>
+                                        </p:tgtEl>
+                                        <p:attrNameLst>
+                                          <p:attrName>ppt_w</p:attrName>
+                                        </p:attrNameLst>
+                                      </p:cBhvr>
+                                      <p:tavLst>
+                                        <p:tav tm="0">
+                                          <p:val>
+                                            <p:fltVal val="0"/>
+                                          </p:val>
+                                        </p:tav>
+                                        <p:tav tm="100000">
+                                          <p:val>
+                                            <p:strVal val="#ppt_w"/>
+                                          </p:val>
+                                        </p:tav>
+                                      </p:tavLst>
+                                    </p:anim>
+                                    <p:anim calcmode="lin" valueType="num">
+                                      <p:cBhvr>
+                                        <p:cTn id="57" dur="500" fill="hold"/>
+                                        <p:tgtEl>
+                                          <p:spTgt spid="3">
+                                            <p:txEl>
+                                              <p:pRg st="6" end="6"/>
+                                            </p:txEl>
+                                          </p:spTgt>
+                                        </p:tgtEl>
+                                        <p:attrNameLst>
                                           <p:attrName>ppt_h</p:attrName>
                                         </p:attrNameLst>
                                       </p:cBhvr>
@@ -9250,11 +9522,471 @@
                                     </p:anim>
                                     <p:animEffect transition="in" filter="fade">
                                       <p:cBhvr>
-                                        <p:cTn id="51" dur="500"/>
+                                        <p:cTn id="58" dur="500"/>
                                         <p:tgtEl>
                                           <p:spTgt spid="3">
                                             <p:txEl>
                                               <p:pRg st="6" end="6"/>
+                                            </p:txEl>
+                                          </p:spTgt>
+                                        </p:tgtEl>
+                                      </p:cBhvr>
+                                    </p:animEffect>
+                                  </p:childTnLst>
+                                </p:cTn>
+                              </p:par>
+                            </p:childTnLst>
+                          </p:cTn>
+                        </p:par>
+                      </p:childTnLst>
+                    </p:cTn>
+                  </p:par>
+                  <p:par>
+                    <p:cTn id="59" fill="hold">
+                      <p:stCondLst>
+                        <p:cond delay="indefinite"/>
+                      </p:stCondLst>
+                      <p:childTnLst>
+                        <p:par>
+                          <p:cTn id="60" fill="hold">
+                            <p:stCondLst>
+                              <p:cond delay="0"/>
+                            </p:stCondLst>
+                            <p:childTnLst>
+                              <p:par>
+                                <p:cTn id="61" presetID="53" presetClass="entr" presetSubtype="16" fill="hold" nodeType="clickEffect">
+                                  <p:stCondLst>
+                                    <p:cond delay="0"/>
+                                  </p:stCondLst>
+                                  <p:childTnLst>
+                                    <p:set>
+                                      <p:cBhvr>
+                                        <p:cTn id="62" dur="1" fill="hold">
+                                          <p:stCondLst>
+                                            <p:cond delay="0"/>
+                                          </p:stCondLst>
+                                        </p:cTn>
+                                        <p:tgtEl>
+                                          <p:spTgt spid="3">
+                                            <p:txEl>
+                                              <p:pRg st="7" end="7"/>
+                                            </p:txEl>
+                                          </p:spTgt>
+                                        </p:tgtEl>
+                                        <p:attrNameLst>
+                                          <p:attrName>style.visibility</p:attrName>
+                                        </p:attrNameLst>
+                                      </p:cBhvr>
+                                      <p:to>
+                                        <p:strVal val="visible"/>
+                                      </p:to>
+                                    </p:set>
+                                    <p:anim calcmode="lin" valueType="num">
+                                      <p:cBhvr>
+                                        <p:cTn id="63" dur="500" fill="hold"/>
+                                        <p:tgtEl>
+                                          <p:spTgt spid="3">
+                                            <p:txEl>
+                                              <p:pRg st="7" end="7"/>
+                                            </p:txEl>
+                                          </p:spTgt>
+                                        </p:tgtEl>
+                                        <p:attrNameLst>
+                                          <p:attrName>ppt_w</p:attrName>
+                                        </p:attrNameLst>
+                                      </p:cBhvr>
+                                      <p:tavLst>
+                                        <p:tav tm="0">
+                                          <p:val>
+                                            <p:fltVal val="0"/>
+                                          </p:val>
+                                        </p:tav>
+                                        <p:tav tm="100000">
+                                          <p:val>
+                                            <p:strVal val="#ppt_w"/>
+                                          </p:val>
+                                        </p:tav>
+                                      </p:tavLst>
+                                    </p:anim>
+                                    <p:anim calcmode="lin" valueType="num">
+                                      <p:cBhvr>
+                                        <p:cTn id="64" dur="500" fill="hold"/>
+                                        <p:tgtEl>
+                                          <p:spTgt spid="3">
+                                            <p:txEl>
+                                              <p:pRg st="7" end="7"/>
+                                            </p:txEl>
+                                          </p:spTgt>
+                                        </p:tgtEl>
+                                        <p:attrNameLst>
+                                          <p:attrName>ppt_h</p:attrName>
+                                        </p:attrNameLst>
+                                      </p:cBhvr>
+                                      <p:tavLst>
+                                        <p:tav tm="0">
+                                          <p:val>
+                                            <p:fltVal val="0"/>
+                                          </p:val>
+                                        </p:tav>
+                                        <p:tav tm="100000">
+                                          <p:val>
+                                            <p:strVal val="#ppt_h"/>
+                                          </p:val>
+                                        </p:tav>
+                                      </p:tavLst>
+                                    </p:anim>
+                                    <p:animEffect transition="in" filter="fade">
+                                      <p:cBhvr>
+                                        <p:cTn id="65" dur="500"/>
+                                        <p:tgtEl>
+                                          <p:spTgt spid="3">
+                                            <p:txEl>
+                                              <p:pRg st="7" end="7"/>
+                                            </p:txEl>
+                                          </p:spTgt>
+                                        </p:tgtEl>
+                                      </p:cBhvr>
+                                    </p:animEffect>
+                                  </p:childTnLst>
+                                </p:cTn>
+                              </p:par>
+                            </p:childTnLst>
+                          </p:cTn>
+                        </p:par>
+                      </p:childTnLst>
+                    </p:cTn>
+                  </p:par>
+                  <p:par>
+                    <p:cTn id="66" fill="hold">
+                      <p:stCondLst>
+                        <p:cond delay="indefinite"/>
+                      </p:stCondLst>
+                      <p:childTnLst>
+                        <p:par>
+                          <p:cTn id="67" fill="hold">
+                            <p:stCondLst>
+                              <p:cond delay="0"/>
+                            </p:stCondLst>
+                            <p:childTnLst>
+                              <p:par>
+                                <p:cTn id="68" presetID="53" presetClass="entr" presetSubtype="16" fill="hold" nodeType="clickEffect">
+                                  <p:stCondLst>
+                                    <p:cond delay="0"/>
+                                  </p:stCondLst>
+                                  <p:childTnLst>
+                                    <p:set>
+                                      <p:cBhvr>
+                                        <p:cTn id="69" dur="1" fill="hold">
+                                          <p:stCondLst>
+                                            <p:cond delay="0"/>
+                                          </p:stCondLst>
+                                        </p:cTn>
+                                        <p:tgtEl>
+                                          <p:spTgt spid="3">
+                                            <p:txEl>
+                                              <p:pRg st="8" end="8"/>
+                                            </p:txEl>
+                                          </p:spTgt>
+                                        </p:tgtEl>
+                                        <p:attrNameLst>
+                                          <p:attrName>style.visibility</p:attrName>
+                                        </p:attrNameLst>
+                                      </p:cBhvr>
+                                      <p:to>
+                                        <p:strVal val="visible"/>
+                                      </p:to>
+                                    </p:set>
+                                    <p:anim calcmode="lin" valueType="num">
+                                      <p:cBhvr>
+                                        <p:cTn id="70" dur="500" fill="hold"/>
+                                        <p:tgtEl>
+                                          <p:spTgt spid="3">
+                                            <p:txEl>
+                                              <p:pRg st="8" end="8"/>
+                                            </p:txEl>
+                                          </p:spTgt>
+                                        </p:tgtEl>
+                                        <p:attrNameLst>
+                                          <p:attrName>ppt_w</p:attrName>
+                                        </p:attrNameLst>
+                                      </p:cBhvr>
+                                      <p:tavLst>
+                                        <p:tav tm="0">
+                                          <p:val>
+                                            <p:fltVal val="0"/>
+                                          </p:val>
+                                        </p:tav>
+                                        <p:tav tm="100000">
+                                          <p:val>
+                                            <p:strVal val="#ppt_w"/>
+                                          </p:val>
+                                        </p:tav>
+                                      </p:tavLst>
+                                    </p:anim>
+                                    <p:anim calcmode="lin" valueType="num">
+                                      <p:cBhvr>
+                                        <p:cTn id="71" dur="500" fill="hold"/>
+                                        <p:tgtEl>
+                                          <p:spTgt spid="3">
+                                            <p:txEl>
+                                              <p:pRg st="8" end="8"/>
+                                            </p:txEl>
+                                          </p:spTgt>
+                                        </p:tgtEl>
+                                        <p:attrNameLst>
+                                          <p:attrName>ppt_h</p:attrName>
+                                        </p:attrNameLst>
+                                      </p:cBhvr>
+                                      <p:tavLst>
+                                        <p:tav tm="0">
+                                          <p:val>
+                                            <p:fltVal val="0"/>
+                                          </p:val>
+                                        </p:tav>
+                                        <p:tav tm="100000">
+                                          <p:val>
+                                            <p:strVal val="#ppt_h"/>
+                                          </p:val>
+                                        </p:tav>
+                                      </p:tavLst>
+                                    </p:anim>
+                                    <p:animEffect transition="in" filter="fade">
+                                      <p:cBhvr>
+                                        <p:cTn id="72" dur="500"/>
+                                        <p:tgtEl>
+                                          <p:spTgt spid="3">
+                                            <p:txEl>
+                                              <p:pRg st="8" end="8"/>
+                                            </p:txEl>
+                                          </p:spTgt>
+                                        </p:tgtEl>
+                                      </p:cBhvr>
+                                    </p:animEffect>
+                                  </p:childTnLst>
+                                </p:cTn>
+                              </p:par>
+                            </p:childTnLst>
+                          </p:cTn>
+                        </p:par>
+                      </p:childTnLst>
+                    </p:cTn>
+                  </p:par>
+                  <p:par>
+                    <p:cTn id="73" fill="hold">
+                      <p:stCondLst>
+                        <p:cond delay="indefinite"/>
+                      </p:stCondLst>
+                      <p:childTnLst>
+                        <p:par>
+                          <p:cTn id="74" fill="hold">
+                            <p:stCondLst>
+                              <p:cond delay="0"/>
+                            </p:stCondLst>
+                            <p:childTnLst>
+                              <p:par>
+                                <p:cTn id="75" presetID="53" presetClass="entr" presetSubtype="16" fill="hold" nodeType="clickEffect">
+                                  <p:stCondLst>
+                                    <p:cond delay="0"/>
+                                  </p:stCondLst>
+                                  <p:childTnLst>
+                                    <p:set>
+                                      <p:cBhvr>
+                                        <p:cTn id="76" dur="1" fill="hold">
+                                          <p:stCondLst>
+                                            <p:cond delay="0"/>
+                                          </p:stCondLst>
+                                        </p:cTn>
+                                        <p:tgtEl>
+                                          <p:spTgt spid="3">
+                                            <p:txEl>
+                                              <p:pRg st="9" end="9"/>
+                                            </p:txEl>
+                                          </p:spTgt>
+                                        </p:tgtEl>
+                                        <p:attrNameLst>
+                                          <p:attrName>style.visibility</p:attrName>
+                                        </p:attrNameLst>
+                                      </p:cBhvr>
+                                      <p:to>
+                                        <p:strVal val="visible"/>
+                                      </p:to>
+                                    </p:set>
+                                    <p:anim calcmode="lin" valueType="num">
+                                      <p:cBhvr>
+                                        <p:cTn id="77" dur="500" fill="hold"/>
+                                        <p:tgtEl>
+                                          <p:spTgt spid="3">
+                                            <p:txEl>
+                                              <p:pRg st="9" end="9"/>
+                                            </p:txEl>
+                                          </p:spTgt>
+                                        </p:tgtEl>
+                                        <p:attrNameLst>
+                                          <p:attrName>ppt_w</p:attrName>
+                                        </p:attrNameLst>
+                                      </p:cBhvr>
+                                      <p:tavLst>
+                                        <p:tav tm="0">
+                                          <p:val>
+                                            <p:fltVal val="0"/>
+                                          </p:val>
+                                        </p:tav>
+                                        <p:tav tm="100000">
+                                          <p:val>
+                                            <p:strVal val="#ppt_w"/>
+                                          </p:val>
+                                        </p:tav>
+                                      </p:tavLst>
+                                    </p:anim>
+                                    <p:anim calcmode="lin" valueType="num">
+                                      <p:cBhvr>
+                                        <p:cTn id="78" dur="500" fill="hold"/>
+                                        <p:tgtEl>
+                                          <p:spTgt spid="3">
+                                            <p:txEl>
+                                              <p:pRg st="9" end="9"/>
+                                            </p:txEl>
+                                          </p:spTgt>
+                                        </p:tgtEl>
+                                        <p:attrNameLst>
+                                          <p:attrName>ppt_h</p:attrName>
+                                        </p:attrNameLst>
+                                      </p:cBhvr>
+                                      <p:tavLst>
+                                        <p:tav tm="0">
+                                          <p:val>
+                                            <p:fltVal val="0"/>
+                                          </p:val>
+                                        </p:tav>
+                                        <p:tav tm="100000">
+                                          <p:val>
+                                            <p:strVal val="#ppt_h"/>
+                                          </p:val>
+                                        </p:tav>
+                                      </p:tavLst>
+                                    </p:anim>
+                                    <p:animEffect transition="in" filter="fade">
+                                      <p:cBhvr>
+                                        <p:cTn id="79" dur="500"/>
+                                        <p:tgtEl>
+                                          <p:spTgt spid="3">
+                                            <p:txEl>
+                                              <p:pRg st="9" end="9"/>
+                                            </p:txEl>
+                                          </p:spTgt>
+                                        </p:tgtEl>
+                                      </p:cBhvr>
+                                    </p:animEffect>
+                                  </p:childTnLst>
+                                </p:cTn>
+                              </p:par>
+                            </p:childTnLst>
+                          </p:cTn>
+                        </p:par>
+                      </p:childTnLst>
+                    </p:cTn>
+                  </p:par>
+                  <p:par>
+                    <p:cTn id="80" fill="hold">
+                      <p:stCondLst>
+                        <p:cond delay="indefinite"/>
+                      </p:stCondLst>
+                      <p:childTnLst>
+                        <p:par>
+                          <p:cTn id="81" fill="hold">
+                            <p:stCondLst>
+                              <p:cond delay="0"/>
+                            </p:stCondLst>
+                            <p:childTnLst>
+                              <p:par>
+                                <p:cTn id="82" presetID="53" presetClass="entr" presetSubtype="16" fill="hold" nodeType="clickEffect">
+                                  <p:stCondLst>
+                                    <p:cond delay="0"/>
+                                  </p:stCondLst>
+                                  <p:childTnLst>
+                                    <p:set>
+                                      <p:cBhvr>
+                                        <p:cTn id="83" dur="1" fill="hold">
+                                          <p:stCondLst>
+                                            <p:cond delay="0"/>
+                                          </p:stCondLst>
+                                        </p:cTn>
+                                        <p:tgtEl>
+                                          <p:spTgt spid="3">
+                                            <p:txEl>
+                                              <p:pRg st="10" end="10"/>
+                                            </p:txEl>
+                                          </p:spTgt>
+                                        </p:tgtEl>
+                                        <p:attrNameLst>
+                                          <p:attrName>style.visibility</p:attrName>
+                                        </p:attrNameLst>
+                                      </p:cBhvr>
+                                      <p:to>
+                                        <p:strVal val="visible"/>
+                                      </p:to>
+                                    </p:set>
+                                    <p:anim calcmode="lin" valueType="num">
+                                      <p:cBhvr>
+                                        <p:cTn id="84" dur="500" fill="hold"/>
+                                        <p:tgtEl>
+                                          <p:spTgt spid="3">
+                                            <p:txEl>
+                                              <p:pRg st="10" end="10"/>
+                                            </p:txEl>
+                                          </p:spTgt>
+                                        </p:tgtEl>
+                                        <p:attrNameLst>
+                                          <p:attrName>ppt_w</p:attrName>
+                                        </p:attrNameLst>
+                                      </p:cBhvr>
+                                      <p:tavLst>
+                                        <p:tav tm="0">
+                                          <p:val>
+                                            <p:fltVal val="0"/>
+                                          </p:val>
+                                        </p:tav>
+                                        <p:tav tm="100000">
+                                          <p:val>
+                                            <p:strVal val="#ppt_w"/>
+                                          </p:val>
+                                        </p:tav>
+                                      </p:tavLst>
+                                    </p:anim>
+                                    <p:anim calcmode="lin" valueType="num">
+                                      <p:cBhvr>
+                                        <p:cTn id="85" dur="500" fill="hold"/>
+                                        <p:tgtEl>
+                                          <p:spTgt spid="3">
+                                            <p:txEl>
+                                              <p:pRg st="10" end="10"/>
+                                            </p:txEl>
+                                          </p:spTgt>
+                                        </p:tgtEl>
+                                        <p:attrNameLst>
+                                          <p:attrName>ppt_h</p:attrName>
+                                        </p:attrNameLst>
+                                      </p:cBhvr>
+                                      <p:tavLst>
+                                        <p:tav tm="0">
+                                          <p:val>
+                                            <p:fltVal val="0"/>
+                                          </p:val>
+                                        </p:tav>
+                                        <p:tav tm="100000">
+                                          <p:val>
+                                            <p:strVal val="#ppt_h"/>
+                                          </p:val>
+                                        </p:tav>
+                                      </p:tavLst>
+                                    </p:anim>
+                                    <p:animEffect transition="in" filter="fade">
+                                      <p:cBhvr>
+                                        <p:cTn id="86" dur="500"/>
+                                        <p:tgtEl>
+                                          <p:spTgt spid="3">
+                                            <p:txEl>
+                                              <p:pRg st="10" end="10"/>
                                             </p:txEl>
                                           </p:spTgt>
                                         </p:tgtEl>
@@ -9460,15 +10192,7 @@
           <a:p>
             <a:r>
               <a:rPr lang="en-US" dirty="0"/>
-              <a:t>To </a:t>
-            </a:r>
-            <a:r>
-              <a:rPr lang="en-US" dirty="0" err="1"/>
-              <a:t>achive</a:t>
-            </a:r>
-            <a:r>
-              <a:rPr lang="en-US" dirty="0"/>
-              <a:t> that we could implement the following :</a:t>
+              <a:t>To achieve that we could implement the following :</a:t>
             </a:r>
           </a:p>
           <a:p>
@@ -9578,13 +10302,13 @@
   <p:clrMapOvr>
     <a:masterClrMapping/>
   </p:clrMapOvr>
-  <mc:AlternateContent xmlns:mc="http://schemas.openxmlformats.org/markup-compatibility/2006">
-    <mc:Choice xmlns:p159="http://schemas.microsoft.com/office/powerpoint/2015/09/main" Requires="p159">
+  <mc:AlternateContent xmlns:mc="http://schemas.openxmlformats.org/markup-compatibility/2006" xmlns:p159="http://schemas.microsoft.com/office/powerpoint/2015/09/main">
+    <mc:Choice Requires="p159">
       <p:transition xmlns:p14="http://schemas.microsoft.com/office/powerpoint/2010/main" spd="slow" p14:dur="2000">
         <p159:morph option="byObject"/>
       </p:transition>
     </mc:Choice>
-    <mc:Fallback>
+    <mc:Fallback xmlns="">
       <p:transition spd="slow">
         <p:fade/>
       </p:transition>
@@ -10511,13 +11235,13 @@
   <p:clrMapOvr>
     <a:masterClrMapping/>
   </p:clrMapOvr>
-  <mc:AlternateContent xmlns:mc="http://schemas.openxmlformats.org/markup-compatibility/2006">
-    <mc:Choice xmlns:p159="http://schemas.microsoft.com/office/powerpoint/2015/09/main" Requires="p159">
+  <mc:AlternateContent xmlns:mc="http://schemas.openxmlformats.org/markup-compatibility/2006" xmlns:p159="http://schemas.microsoft.com/office/powerpoint/2015/09/main">
+    <mc:Choice Requires="p159">
       <p:transition xmlns:p14="http://schemas.microsoft.com/office/powerpoint/2010/main" spd="slow" p14:dur="2000">
         <p159:morph option="byObject"/>
       </p:transition>
     </mc:Choice>
-    <mc:Fallback>
+    <mc:Fallback xmlns="">
       <p:transition spd="slow">
         <p:fade/>
       </p:transition>
@@ -10914,13 +11638,13 @@
   <p:clrMapOvr>
     <a:masterClrMapping/>
   </p:clrMapOvr>
-  <mc:AlternateContent xmlns:mc="http://schemas.openxmlformats.org/markup-compatibility/2006">
-    <mc:Choice xmlns:p159="http://schemas.microsoft.com/office/powerpoint/2015/09/main" Requires="p159">
+  <mc:AlternateContent xmlns:mc="http://schemas.openxmlformats.org/markup-compatibility/2006" xmlns:p159="http://schemas.microsoft.com/office/powerpoint/2015/09/main">
+    <mc:Choice Requires="p159">
       <p:transition xmlns:p14="http://schemas.microsoft.com/office/powerpoint/2010/main" spd="slow" p14:dur="2000">
         <p159:morph option="byObject"/>
       </p:transition>
     </mc:Choice>
-    <mc:Fallback>
+    <mc:Fallback xmlns="">
       <p:transition spd="slow">
         <p:fade/>
       </p:transition>

</xml_diff>